<commit_message>
Testing deployment to Azure
</commit_message>
<xml_diff>
--- a/assets/Hivematic Logo.pptx
+++ b/assets/Hivematic Logo.pptx
@@ -107,6 +107,11 @@
       </a:defRPr>
     </a:lvl9pPr>
   </p:defaultTextStyle>
+  <p:extLst>
+    <p:ext uri="{EFAFB233-063F-42B5-8137-9DF3F51BA10A}">
+      <p15:sldGuideLst xmlns:p15="http://schemas.microsoft.com/office/powerpoint/2012/main"/>
+    </p:ext>
+  </p:extLst>
 </p:presentation>
 </file>
 
@@ -3781,10 +3786,10 @@
       </p:grpSpPr>
       <p:grpSp>
         <p:nvGrpSpPr>
-          <p:cNvPr id="17" name="Group 16">
-            <a:extLst>
-              <a:ext uri="{FF2B5EF4-FFF2-40B4-BE49-F238E27FC236}">
-                <a16:creationId xmlns:a16="http://schemas.microsoft.com/office/drawing/2014/main" id="{EF3CBA6E-6CC0-4C4B-B484-3447147F4989}"/>
+          <p:cNvPr id="3" name="Group 2">
+            <a:extLst>
+              <a:ext uri="{FF2B5EF4-FFF2-40B4-BE49-F238E27FC236}">
+                <a16:creationId xmlns:a16="http://schemas.microsoft.com/office/drawing/2014/main" id="{5AD7C9F2-5094-494A-BE7D-83A062309D6E}"/>
               </a:ext>
             </a:extLst>
           </p:cNvPr>
@@ -3795,8 +3800,8 @@
           <a:xfrm>
             <a:off x="2592532" y="129267"/>
             <a:ext cx="5668241" cy="6575155"/>
-            <a:chOff x="2940767" y="533220"/>
-            <a:chExt cx="3272852" cy="3796506"/>
+            <a:chOff x="2592532" y="129267"/>
+            <a:chExt cx="5668241" cy="6575155"/>
           </a:xfrm>
         </p:grpSpPr>
         <p:sp>
@@ -3813,8 +3818,8 @@
           </p:nvSpPr>
           <p:spPr bwMode="auto">
             <a:xfrm rot="5400000">
-              <a:off x="2678940" y="795047"/>
-              <a:ext cx="3796506" cy="3272852"/>
+              <a:off x="2139075" y="582724"/>
+              <a:ext cx="6575155" cy="5668241"/>
             </a:xfrm>
             <a:prstGeom prst="hexagon">
               <a:avLst>
@@ -3880,10 +3885,10 @@
         </p:sp>
         <p:grpSp>
           <p:nvGrpSpPr>
-            <p:cNvPr id="16" name="Group 15">
+            <p:cNvPr id="2" name="Group 1">
               <a:extLst>
                 <a:ext uri="{FF2B5EF4-FFF2-40B4-BE49-F238E27FC236}">
-                  <a16:creationId xmlns:a16="http://schemas.microsoft.com/office/drawing/2014/main" id="{496A5413-2902-4A5F-BBEF-3C7B25C4BB3F}"/>
+                  <a16:creationId xmlns:a16="http://schemas.microsoft.com/office/drawing/2014/main" id="{279C0A0F-300D-43DE-B077-7AAEE8D66F2D}"/>
                 </a:ext>
               </a:extLst>
             </p:cNvPr>
@@ -3892,10 +3897,10 @@
           </p:nvGrpSpPr>
           <p:grpSpPr>
             <a:xfrm>
-              <a:off x="3368386" y="1200150"/>
-              <a:ext cx="2561360" cy="2296392"/>
-              <a:chOff x="3368386" y="1200150"/>
-              <a:chExt cx="2561360" cy="2296392"/>
+              <a:off x="3208648" y="1340257"/>
+              <a:ext cx="4436010" cy="3915982"/>
+              <a:chOff x="3333124" y="1345452"/>
+              <a:chExt cx="4436010" cy="3915982"/>
             </a:xfrm>
           </p:grpSpPr>
           <p:sp>
@@ -3912,8 +3917,8 @@
             </p:nvSpPr>
             <p:spPr>
               <a:xfrm>
-                <a:off x="3368386" y="2431473"/>
-                <a:ext cx="869374" cy="869374"/>
+                <a:off x="3333124" y="3416845"/>
+                <a:ext cx="1505666" cy="1505666"/>
               </a:xfrm>
               <a:prstGeom prst="ellipse">
                 <a:avLst/>
@@ -3964,8 +3969,8 @@
             </p:nvSpPr>
             <p:spPr>
               <a:xfrm>
-                <a:off x="3881004" y="2431473"/>
-                <a:ext cx="869374" cy="869374"/>
+                <a:off x="4220925" y="3416845"/>
+                <a:ext cx="1505666" cy="1505666"/>
               </a:xfrm>
               <a:prstGeom prst="ellipse">
                 <a:avLst/>
@@ -4016,66 +4021,14 @@
             </p:nvSpPr>
             <p:spPr>
               <a:xfrm>
-                <a:off x="4393622" y="2431473"/>
-                <a:ext cx="869374" cy="869374"/>
+                <a:off x="5108726" y="3416845"/>
+                <a:ext cx="1505666" cy="1505666"/>
               </a:xfrm>
               <a:prstGeom prst="ellipse">
                 <a:avLst/>
               </a:prstGeom>
               <a:solidFill>
                 <a:srgbClr val="FFCC00"/>
-              </a:solidFill>
-              <a:ln>
-                <a:noFill/>
-              </a:ln>
-            </p:spPr>
-            <p:style>
-              <a:lnRef idx="2">
-                <a:schemeClr val="accent1">
-                  <a:shade val="50000"/>
-                </a:schemeClr>
-              </a:lnRef>
-              <a:fillRef idx="1">
-                <a:schemeClr val="accent1"/>
-              </a:fillRef>
-              <a:effectRef idx="0">
-                <a:schemeClr val="accent1"/>
-              </a:effectRef>
-              <a:fontRef idx="minor">
-                <a:schemeClr val="lt1"/>
-              </a:fontRef>
-            </p:style>
-            <p:txBody>
-              <a:bodyPr rtlCol="0" anchor="ctr"/>
-              <a:lstStyle/>
-              <a:p>
-                <a:pPr algn="ctr"/>
-                <a:endParaRPr lang="en-GB"/>
-              </a:p>
-            </p:txBody>
-          </p:sp>
-          <p:sp>
-            <p:nvSpPr>
-              <p:cNvPr id="9" name="Teardrop 8">
-                <a:extLst>
-                  <a:ext uri="{FF2B5EF4-FFF2-40B4-BE49-F238E27FC236}">
-                    <a16:creationId xmlns:a16="http://schemas.microsoft.com/office/drawing/2014/main" id="{F934376F-8C77-448B-976C-E905A836D663}"/>
-                  </a:ext>
-                </a:extLst>
-              </p:cNvPr>
-              <p:cNvSpPr/>
-              <p:nvPr/>
-            </p:nvSpPr>
-            <p:spPr>
-              <a:xfrm rot="10800000">
-                <a:off x="4618758" y="1200150"/>
-                <a:ext cx="1122218" cy="1122218"/>
-              </a:xfrm>
-              <a:prstGeom prst="teardrop">
-                <a:avLst/>
-              </a:prstGeom>
-              <a:solidFill>
-                <a:schemeClr val="bg1"/>
               </a:solidFill>
               <a:ln>
                 <a:noFill/>
@@ -4120,8 +4073,8 @@
             </p:nvSpPr>
             <p:spPr>
               <a:xfrm rot="10800000" flipH="1">
-                <a:off x="3368387" y="1200150"/>
-                <a:ext cx="1117022" cy="1117022"/>
+                <a:off x="3562039" y="1345452"/>
+                <a:ext cx="1769355" cy="1769355"/>
               </a:xfrm>
               <a:prstGeom prst="teardrop">
                 <a:avLst/>
@@ -4172,8 +4125,8 @@
             </p:nvSpPr>
             <p:spPr>
               <a:xfrm>
-                <a:off x="4864678" y="2431474"/>
-                <a:ext cx="1065068" cy="1065068"/>
+                <a:off x="5924547" y="3416847"/>
+                <a:ext cx="1844587" cy="1844587"/>
               </a:xfrm>
               <a:prstGeom prst="ellipse">
                 <a:avLst/>
@@ -4224,8 +4177,8 @@
             </p:nvSpPr>
             <p:spPr>
               <a:xfrm>
-                <a:off x="5096743" y="2714626"/>
-                <a:ext cx="249382" cy="249382"/>
+                <a:off x="6326459" y="3907237"/>
+                <a:ext cx="431904" cy="431904"/>
               </a:xfrm>
               <a:prstGeom prst="ellipse">
                 <a:avLst/>
@@ -4276,10 +4229,62 @@
             </p:nvSpPr>
             <p:spPr>
               <a:xfrm>
-                <a:off x="5495061" y="2714626"/>
-                <a:ext cx="249382" cy="249382"/>
+                <a:off x="7016305" y="3907237"/>
+                <a:ext cx="431904" cy="431904"/>
               </a:xfrm>
               <a:prstGeom prst="ellipse">
+                <a:avLst/>
+              </a:prstGeom>
+              <a:solidFill>
+                <a:schemeClr val="bg1"/>
+              </a:solidFill>
+              <a:ln>
+                <a:noFill/>
+              </a:ln>
+            </p:spPr>
+            <p:style>
+              <a:lnRef idx="2">
+                <a:schemeClr val="accent1">
+                  <a:shade val="50000"/>
+                </a:schemeClr>
+              </a:lnRef>
+              <a:fillRef idx="1">
+                <a:schemeClr val="accent1"/>
+              </a:fillRef>
+              <a:effectRef idx="0">
+                <a:schemeClr val="accent1"/>
+              </a:effectRef>
+              <a:fontRef idx="minor">
+                <a:schemeClr val="lt1"/>
+              </a:fontRef>
+            </p:style>
+            <p:txBody>
+              <a:bodyPr rtlCol="0" anchor="ctr"/>
+              <a:lstStyle/>
+              <a:p>
+                <a:pPr algn="ctr"/>
+                <a:endParaRPr lang="en-GB"/>
+              </a:p>
+            </p:txBody>
+          </p:sp>
+          <p:sp>
+            <p:nvSpPr>
+              <p:cNvPr id="14" name="Teardrop 13">
+                <a:extLst>
+                  <a:ext uri="{FF2B5EF4-FFF2-40B4-BE49-F238E27FC236}">
+                    <a16:creationId xmlns:a16="http://schemas.microsoft.com/office/drawing/2014/main" id="{4D36D860-9A29-4840-A609-47197937C83F}"/>
+                  </a:ext>
+                </a:extLst>
+              </p:cNvPr>
+              <p:cNvSpPr/>
+              <p:nvPr/>
+            </p:nvSpPr>
+            <p:spPr>
+              <a:xfrm rot="10800000">
+                <a:off x="5729714" y="1345453"/>
+                <a:ext cx="1769355" cy="1769355"/>
+              </a:xfrm>
+              <a:prstGeom prst="teardrop">
                 <a:avLst/>
               </a:prstGeom>
               <a:solidFill>

</xml_diff>